<commit_message>
TOM 01 TOM 08 ANGEPASST
</commit_message>
<xml_diff>
--- a/music moves/Tomatoes (TOM)/ger/apprentice/ger_TOM_08_Aufdrehen-fertig-los_MM_A.pptx
+++ b/music moves/Tomatoes (TOM)/ger/apprentice/ger_TOM_08_Aufdrehen-fertig-los_MM_A.pptx
@@ -5,7 +5,7 @@
     <p:sldMasterId id="2147483648" r:id="rId1"/>
   </p:sldMasterIdLst>
   <p:sldIdLst>
-    <p:sldId id="257" r:id="rId2"/>
+    <p:sldId id="258" r:id="rId2"/>
     <p:sldId id="256" r:id="rId3"/>
   </p:sldIdLst>
   <p:sldSz cx="7562850" cy="5330825"/>
@@ -1574,7 +1574,7 @@
         </p:nvSpPr>
         <p:spPr>
           <a:xfrm>
-            <a:off x="1166813" y="705306"/>
+            <a:off x="1166813" y="737258"/>
             <a:ext cx="4612406" cy="461665"/>
           </a:xfrm>
         </p:spPr>
@@ -1600,10 +1600,306 @@
           </a:p>
         </p:txBody>
       </p:sp>
+      <p:sp>
+        <p:nvSpPr>
+          <p:cNvPr id="4" name="Inhaltsplatzhalter 3"/>
+          <p:cNvSpPr>
+            <a:spLocks noGrp="1"/>
+          </p:cNvSpPr>
+          <p:nvPr>
+            <p:ph idx="13"/>
+          </p:nvPr>
+        </p:nvSpPr>
+        <p:spPr/>
+        <p:txBody>
+          <a:bodyPr>
+            <a:normAutofit lnSpcReduction="10000"/>
+          </a:bodyPr>
+          <a:lstStyle/>
+          <a:p>
+            <a:pPr>
+              <a:spcBef>
+                <a:spcPts val="1000"/>
+              </a:spcBef>
+            </a:pPr>
+            <a:r>
+              <a:rPr lang="de-DE" sz="1200" dirty="0"/>
+              <a:t>Die </a:t>
+            </a:r>
+            <a:r>
+              <a:rPr lang="de-DE" sz="1200" dirty="0" err="1"/>
+              <a:t>Pomodoro</a:t>
+            </a:r>
+            <a:r>
+              <a:rPr lang="de-DE" sz="1200" dirty="0"/>
+              <a:t> </a:t>
+            </a:r>
+            <a:r>
+              <a:rPr lang="de-DE" sz="1200" dirty="0" err="1"/>
+              <a:t>Technique</a:t>
+            </a:r>
+            <a:r>
+              <a:rPr lang="de-DE" sz="1200" dirty="0"/>
+              <a:t>® </a:t>
+            </a:r>
+            <a:r>
+              <a:rPr lang="de-DE" sz="1200" baseline="30000" dirty="0"/>
+              <a:t>1</a:t>
+            </a:r>
+            <a:r>
+              <a:rPr lang="de-DE" sz="1200" dirty="0"/>
+              <a:t>  ist ein Zeitmanagementwerkzeug, das von Francesco </a:t>
+            </a:r>
+            <a:r>
+              <a:rPr lang="de-DE" sz="1200" dirty="0" err="1"/>
+              <a:t>Cirillo</a:t>
+            </a:r>
+            <a:r>
+              <a:rPr lang="de-DE" sz="1200" dirty="0"/>
+              <a:t> erfunden wurde. Es kann Dir dabei helfen, konzentrierter und zielgerichteter zu arbeiten.</a:t>
+            </a:r>
+          </a:p>
+          <a:p>
+            <a:pPr lvl="0">
+              <a:spcBef>
+                <a:spcPts val="1000"/>
+              </a:spcBef>
+            </a:pPr>
+            <a:r>
+              <a:rPr lang="de-DE" sz="1200" dirty="0"/>
+              <a:t>Du arbeitest in exakten Zeitfenstern: 25 Minuten mit 5 Minuten Pause.</a:t>
+            </a:r>
+          </a:p>
+          <a:p>
+            <a:pPr lvl="0">
+              <a:spcBef>
+                <a:spcPts val="1000"/>
+              </a:spcBef>
+            </a:pPr>
+            <a:r>
+              <a:rPr lang="de-DE" sz="1200" dirty="0"/>
+              <a:t>Die Zeit wird mit einem </a:t>
+            </a:r>
+            <a:r>
+              <a:rPr lang="de-DE" sz="1200" dirty="0" err="1"/>
+              <a:t>Timer</a:t>
+            </a:r>
+            <a:r>
+              <a:rPr lang="de-DE" sz="1200" dirty="0"/>
+              <a:t> heruntergezählt und sollte nach Möglichkeit nicht unterbrochen werden.</a:t>
+            </a:r>
+          </a:p>
+          <a:p>
+            <a:pPr lvl="0">
+              <a:spcBef>
+                <a:spcPts val="1000"/>
+              </a:spcBef>
+            </a:pPr>
+            <a:r>
+              <a:rPr lang="de-DE" sz="1200" dirty="0"/>
+              <a:t>Jede Tomate ist auf ein Thema fokussiert. </a:t>
+            </a:r>
+          </a:p>
+          <a:p>
+            <a:pPr lvl="0">
+              <a:spcBef>
+                <a:spcPts val="1000"/>
+              </a:spcBef>
+            </a:pPr>
+            <a:r>
+              <a:rPr lang="de-DE" sz="1200" dirty="0"/>
+              <a:t>Das Ziel der Tomate bestimmst Du vorher und nach Ablauf reflektierst Du das Ergebnis und Deine Zufriedenheit.</a:t>
+            </a:r>
+          </a:p>
+          <a:p>
+            <a:pPr lvl="0">
+              <a:spcBef>
+                <a:spcPts val="1000"/>
+              </a:spcBef>
+            </a:pPr>
+            <a:r>
+              <a:rPr lang="de-DE" sz="1200" dirty="0"/>
+              <a:t>Zeit, die Du in Tomaten einteilst, nimmst Du anders wahr. Tomaten helfen Dir zu messen, wie lange Du für bestimmte Aufgaben brauchst. </a:t>
+            </a:r>
+          </a:p>
+          <a:p>
+            <a:pPr lvl="0">
+              <a:spcBef>
+                <a:spcPts val="1000"/>
+              </a:spcBef>
+            </a:pPr>
+            <a:r>
+              <a:rPr lang="de-DE" sz="1200" dirty="0"/>
+              <a:t>Die Pausen zwischen den Tomaten helfen Dir die Konzentration und Motivation über eine längere Zeitspanne aufrecht zu erhalten.</a:t>
+            </a:r>
+          </a:p>
+          <a:p>
+            <a:pPr marL="0" indent="0">
+              <a:buNone/>
+            </a:pPr>
+            <a:endParaRPr lang="de-DE" dirty="0"/>
+          </a:p>
+        </p:txBody>
+      </p:sp>
+      <p:sp>
+        <p:nvSpPr>
+          <p:cNvPr id="5" name="Fußzeilenplatzhalter 19"/>
+          <p:cNvSpPr txBox="1">
+            <a:spLocks/>
+          </p:cNvSpPr>
+          <p:nvPr/>
+        </p:nvSpPr>
+        <p:spPr>
+          <a:xfrm>
+            <a:off x="5086569" y="4776480"/>
+            <a:ext cx="1775894" cy="283817"/>
+          </a:xfrm>
+          <a:prstGeom prst="rect">
+            <a:avLst/>
+          </a:prstGeom>
+        </p:spPr>
+        <p:txBody>
+          <a:bodyPr/>
+          <a:lstStyle>
+            <a:defPPr>
+              <a:defRPr lang="de-DE"/>
+            </a:defPPr>
+            <a:lvl1pPr marL="0" algn="l" defTabSz="403388" rtl="0" eaLnBrk="1" latinLnBrk="0" hangingPunct="1">
+              <a:defRPr sz="1600" kern="1200">
+                <a:solidFill>
+                  <a:schemeClr val="tx1"/>
+                </a:solidFill>
+                <a:latin typeface="+mn-lt"/>
+                <a:ea typeface="+mn-ea"/>
+                <a:cs typeface="+mn-cs"/>
+              </a:defRPr>
+            </a:lvl1pPr>
+            <a:lvl2pPr marL="403388" algn="l" defTabSz="403388" rtl="0" eaLnBrk="1" latinLnBrk="0" hangingPunct="1">
+              <a:defRPr sz="1600" kern="1200">
+                <a:solidFill>
+                  <a:schemeClr val="tx1"/>
+                </a:solidFill>
+                <a:latin typeface="+mn-lt"/>
+                <a:ea typeface="+mn-ea"/>
+                <a:cs typeface="+mn-cs"/>
+              </a:defRPr>
+            </a:lvl2pPr>
+            <a:lvl3pPr marL="806775" algn="l" defTabSz="403388" rtl="0" eaLnBrk="1" latinLnBrk="0" hangingPunct="1">
+              <a:defRPr sz="1600" kern="1200">
+                <a:solidFill>
+                  <a:schemeClr val="tx1"/>
+                </a:solidFill>
+                <a:latin typeface="+mn-lt"/>
+                <a:ea typeface="+mn-ea"/>
+                <a:cs typeface="+mn-cs"/>
+              </a:defRPr>
+            </a:lvl3pPr>
+            <a:lvl4pPr marL="1210163" algn="l" defTabSz="403388" rtl="0" eaLnBrk="1" latinLnBrk="0" hangingPunct="1">
+              <a:defRPr sz="1600" kern="1200">
+                <a:solidFill>
+                  <a:schemeClr val="tx1"/>
+                </a:solidFill>
+                <a:latin typeface="+mn-lt"/>
+                <a:ea typeface="+mn-ea"/>
+                <a:cs typeface="+mn-cs"/>
+              </a:defRPr>
+            </a:lvl4pPr>
+            <a:lvl5pPr marL="1613550" algn="l" defTabSz="403388" rtl="0" eaLnBrk="1" latinLnBrk="0" hangingPunct="1">
+              <a:defRPr sz="1600" kern="1200">
+                <a:solidFill>
+                  <a:schemeClr val="tx1"/>
+                </a:solidFill>
+                <a:latin typeface="+mn-lt"/>
+                <a:ea typeface="+mn-ea"/>
+                <a:cs typeface="+mn-cs"/>
+              </a:defRPr>
+            </a:lvl5pPr>
+            <a:lvl6pPr marL="2016938" algn="l" defTabSz="403388" rtl="0" eaLnBrk="1" latinLnBrk="0" hangingPunct="1">
+              <a:defRPr sz="1600" kern="1200">
+                <a:solidFill>
+                  <a:schemeClr val="tx1"/>
+                </a:solidFill>
+                <a:latin typeface="+mn-lt"/>
+                <a:ea typeface="+mn-ea"/>
+                <a:cs typeface="+mn-cs"/>
+              </a:defRPr>
+            </a:lvl6pPr>
+            <a:lvl7pPr marL="2420325" algn="l" defTabSz="403388" rtl="0" eaLnBrk="1" latinLnBrk="0" hangingPunct="1">
+              <a:defRPr sz="1600" kern="1200">
+                <a:solidFill>
+                  <a:schemeClr val="tx1"/>
+                </a:solidFill>
+                <a:latin typeface="+mn-lt"/>
+                <a:ea typeface="+mn-ea"/>
+                <a:cs typeface="+mn-cs"/>
+              </a:defRPr>
+            </a:lvl7pPr>
+            <a:lvl8pPr marL="2823713" algn="l" defTabSz="403388" rtl="0" eaLnBrk="1" latinLnBrk="0" hangingPunct="1">
+              <a:defRPr sz="1600" kern="1200">
+                <a:solidFill>
+                  <a:schemeClr val="tx1"/>
+                </a:solidFill>
+                <a:latin typeface="+mn-lt"/>
+                <a:ea typeface="+mn-ea"/>
+                <a:cs typeface="+mn-cs"/>
+              </a:defRPr>
+            </a:lvl8pPr>
+            <a:lvl9pPr marL="3227100" algn="l" defTabSz="403388" rtl="0" eaLnBrk="1" latinLnBrk="0" hangingPunct="1">
+              <a:defRPr sz="1600" kern="1200">
+                <a:solidFill>
+                  <a:schemeClr val="tx1"/>
+                </a:solidFill>
+                <a:latin typeface="+mn-lt"/>
+                <a:ea typeface="+mn-ea"/>
+                <a:cs typeface="+mn-cs"/>
+              </a:defRPr>
+            </a:lvl9pPr>
+          </a:lstStyle>
+          <a:p>
+            <a:r>
+              <a:rPr lang="de-DE" sz="900" baseline="30000" dirty="0" smtClean="0">
+                <a:solidFill>
+                  <a:schemeClr val="bg1">
+                    <a:lumMod val="65000"/>
+                  </a:schemeClr>
+                </a:solidFill>
+              </a:rPr>
+              <a:t>1</a:t>
+            </a:r>
+            <a:r>
+              <a:rPr lang="de-DE" sz="900" dirty="0" smtClean="0">
+                <a:solidFill>
+                  <a:schemeClr val="bg1">
+                    <a:lumMod val="65000"/>
+                  </a:schemeClr>
+                </a:solidFill>
+              </a:rPr>
+              <a:t>  </a:t>
+            </a:r>
+            <a:r>
+              <a:rPr lang="de-DE" sz="900" dirty="0" err="1" smtClean="0">
+                <a:solidFill>
+                  <a:schemeClr val="bg1">
+                    <a:lumMod val="65000"/>
+                  </a:schemeClr>
+                </a:solidFill>
+              </a:rPr>
+              <a:t>www.pomodorotechnique.com</a:t>
+            </a:r>
+            <a:endParaRPr lang="de-DE" sz="900" dirty="0">
+              <a:solidFill>
+                <a:schemeClr val="bg1">
+                  <a:lumMod val="65000"/>
+                </a:schemeClr>
+              </a:solidFill>
+            </a:endParaRPr>
+          </a:p>
+        </p:txBody>
+      </p:sp>
     </p:spTree>
     <p:extLst>
       <p:ext uri="{BB962C8B-B14F-4D97-AF65-F5344CB8AC3E}">
-        <p14:creationId xmlns:p14="http://schemas.microsoft.com/office/powerpoint/2010/main" val="3371778674"/>
+        <p14:creationId xmlns:p14="http://schemas.microsoft.com/office/powerpoint/2010/main" val="2779365"/>
       </p:ext>
     </p:extLst>
   </p:cSld>
@@ -1642,10 +1938,137 @@
         </p:nvSpPr>
         <p:spPr/>
         <p:txBody>
-          <a:bodyPr/>
+          <a:bodyPr>
+            <a:normAutofit/>
+          </a:bodyPr>
           <a:lstStyle/>
           <a:p>
-            <a:endParaRPr lang="de-DE"/>
+            <a:pPr>
+              <a:lnSpc>
+                <a:spcPct val="100000"/>
+              </a:lnSpc>
+              <a:spcBef>
+                <a:spcPts val="1000"/>
+              </a:spcBef>
+            </a:pPr>
+            <a:r>
+              <a:rPr lang="de-DE" sz="1200" dirty="0"/>
+              <a:t>Besorge Dir einen Zeitmesser. Bewährt haben sich verschiedene Apps bzw. eine herkömmliche Eieruhr.</a:t>
+            </a:r>
+            <a:br>
+              <a:rPr lang="de-DE" sz="1200" dirty="0"/>
+            </a:br>
+            <a:endParaRPr lang="de-DE" sz="1200" dirty="0"/>
+          </a:p>
+          <a:p>
+            <a:pPr>
+              <a:lnSpc>
+                <a:spcPct val="100000"/>
+              </a:lnSpc>
+              <a:spcBef>
+                <a:spcPts val="1000"/>
+              </a:spcBef>
+            </a:pPr>
+            <a:r>
+              <a:rPr lang="de-DE" sz="1200" dirty="0"/>
+              <a:t>Mache zuerst innerhalb von 2 Wochen mindestens 12 Tomaten. </a:t>
+            </a:r>
+            <a:br>
+              <a:rPr lang="de-DE" sz="1200" dirty="0"/>
+            </a:br>
+            <a:endParaRPr lang="de-DE" sz="1200" dirty="0"/>
+          </a:p>
+          <a:p>
+            <a:pPr>
+              <a:lnSpc>
+                <a:spcPct val="100000"/>
+              </a:lnSpc>
+              <a:spcBef>
+                <a:spcPts val="1000"/>
+              </a:spcBef>
+            </a:pPr>
+            <a:r>
+              <a:rPr lang="de-DE" sz="1200" dirty="0"/>
+              <a:t>Verteile Deine Tomaten auf mindestens 8 verschiedene Tage.</a:t>
+            </a:r>
+            <a:br>
+              <a:rPr lang="de-DE" sz="1200" dirty="0"/>
+            </a:br>
+            <a:endParaRPr lang="de-DE" sz="1200" dirty="0"/>
+          </a:p>
+          <a:p>
+            <a:pPr>
+              <a:lnSpc>
+                <a:spcPct val="100000"/>
+              </a:lnSpc>
+              <a:spcBef>
+                <a:spcPts val="1000"/>
+              </a:spcBef>
+            </a:pPr>
+            <a:r>
+              <a:rPr lang="de-DE" sz="1200" dirty="0"/>
+              <a:t>Experimentiere mit der Tomatentechnik in verschiedenen </a:t>
+            </a:r>
+            <a:br>
+              <a:rPr lang="de-DE" sz="1200" dirty="0"/>
+            </a:br>
+            <a:r>
+              <a:rPr lang="de-DE" sz="1200" dirty="0" smtClean="0"/>
+              <a:t>Bereichen Deines Lebens (</a:t>
+            </a:r>
+            <a:r>
+              <a:rPr lang="de-DE" sz="1200" dirty="0"/>
+              <a:t>Tagesgeschäft, Job, </a:t>
+            </a:r>
+            <a:r>
+              <a:rPr lang="de-DE" sz="1200" dirty="0" smtClean="0"/>
+              <a:t>Lernen</a:t>
+            </a:r>
+            <a:r>
+              <a:rPr lang="de-DE" sz="1200" dirty="0"/>
+              <a:t>, </a:t>
+            </a:r>
+            <a:r>
+              <a:rPr lang="de-DE" sz="1200" dirty="0" smtClean="0"/>
+              <a:t/>
+            </a:r>
+            <a:br>
+              <a:rPr lang="de-DE" sz="1200" dirty="0" smtClean="0"/>
+            </a:br>
+            <a:r>
+              <a:rPr lang="de-DE" sz="1200" dirty="0" smtClean="0"/>
+              <a:t>Hausarbeit</a:t>
+            </a:r>
+            <a:r>
+              <a:rPr lang="de-DE" sz="1200" dirty="0"/>
+              <a:t>, Hobby…).</a:t>
+            </a:r>
+            <a:br>
+              <a:rPr lang="de-DE" sz="1200" dirty="0"/>
+            </a:br>
+            <a:endParaRPr lang="de-DE" sz="1200" dirty="0"/>
+          </a:p>
+          <a:p>
+            <a:pPr>
+              <a:lnSpc>
+                <a:spcPct val="100000"/>
+              </a:lnSpc>
+              <a:spcBef>
+                <a:spcPts val="1000"/>
+              </a:spcBef>
+            </a:pPr>
+            <a:r>
+              <a:rPr lang="de-DE" sz="1200" dirty="0"/>
+              <a:t>Dokumentiere zu jeder Tomate vorher Deine </a:t>
+            </a:r>
+            <a:br>
+              <a:rPr lang="de-DE" sz="1200" dirty="0"/>
+            </a:br>
+            <a:r>
+              <a:rPr lang="de-DE" sz="1200" dirty="0"/>
+              <a:t>Ziele und nachher Deine Erfahrungen und Ergebnisse.</a:t>
+            </a:r>
+            <a:endParaRPr lang="de-DE" sz="1200" dirty="0"/>
           </a:p>
         </p:txBody>
       </p:sp>

</xml_diff>

<commit_message>
TOM 08 hochgestellte Ziffer
</commit_message>
<xml_diff>
--- a/music moves/Tomatoes (TOM)/ger/apprentice/ger_TOM_08_Aufdrehen-fertig-los_MM_A.pptx
+++ b/music moves/Tomatoes (TOM)/ger/apprentice/ger_TOM_08_Aufdrehen-fertig-los_MM_A.pptx
@@ -1635,12 +1635,20 @@
               <a:t> </a:t>
             </a:r>
             <a:r>
-              <a:rPr lang="de-DE" sz="1200" dirty="0" err="1"/>
+              <a:rPr lang="de-DE" sz="1200" err="1"/>
               <a:t>Technique</a:t>
             </a:r>
             <a:r>
+              <a:rPr lang="de-DE" sz="1200" smtClean="0"/>
+              <a:t>®</a:t>
+            </a:r>
+            <a:r>
+              <a:rPr lang="de-DE" sz="1200" baseline="30000" smtClean="0"/>
+              <a:t>1</a:t>
+            </a:r>
+            <a:r>
               <a:rPr lang="de-DE" sz="1200" dirty="0"/>
-              <a:t>® 1  ist ein Zeitmanagementwerkzeug, das von Francesco </a:t>
+              <a:t>  ist ein Zeitmanagementwerkzeug, das von Francesco </a:t>
             </a:r>
             <a:r>
               <a:rPr lang="de-DE" sz="1200" dirty="0" err="1"/>
@@ -1967,20 +1975,16 @@
           <a:p>
             <a:r>
               <a:rPr lang="de-DE" sz="1200" dirty="0"/>
-              <a:t>Du kannst die Tomatentechnik auch in verschiedenen Bereichen Deines Lebens (Tagesgeschäft, Job, Lernen, Hausarbeit, Hobby…) ausprobieren, wenn du </a:t>
-            </a:r>
-            <a:r>
-              <a:rPr lang="de-DE" sz="1200"/>
-              <a:t>magst</a:t>
-            </a:r>
-            <a:r>
-              <a:rPr lang="de-DE" sz="1200" smtClean="0"/>
+              <a:t>Du kannst die Tomatentechnik auch in verschiedenen Bereichen Deines Lebens (Tagesgeschäft, Job, Lernen, Hausarbeit, Hobby…) ausprobieren, wenn du magst</a:t>
+            </a:r>
+            <a:r>
+              <a:rPr lang="de-DE" sz="1200" dirty="0" smtClean="0"/>
               <a:t>.</a:t>
             </a:r>
           </a:p>
           <a:p>
             <a:r>
-              <a:rPr lang="de-DE" sz="1200" smtClean="0"/>
+              <a:rPr lang="de-DE" sz="1200" dirty="0" smtClean="0"/>
               <a:t>Dokumentiere </a:t>
             </a:r>
             <a:r>

</xml_diff>